<commit_message>
inputs and flow diagram
</commit_message>
<xml_diff>
--- a/diagrams/data_flow_diagram.pptx
+++ b/diagrams/data_flow_diagram.pptx
@@ -104,6 +104,11 @@
       </a:defRPr>
     </a:lvl9pPr>
   </p:defaultTextStyle>
+  <p:extLst>
+    <p:ext uri="{EFAFB233-063F-42B5-8137-9DF3F51BA10A}">
+      <p15:sldGuideLst xmlns:p15="http://schemas.microsoft.com/office/powerpoint/2012/main"/>
+    </p:ext>
+  </p:extLst>
 </p:presentation>
 </file>
 
@@ -3419,7 +3424,7 @@
               <a:pPr algn="ctr"/>
               <a:r>
                 <a:rPr lang="en-US" sz="1400" dirty="0"/>
-                <a:t>Output Folder</a:t>
+                <a:t>output</a:t>
               </a:r>
               <a:br>
                 <a:rPr lang="en-US" sz="1400" dirty="0"/>
@@ -3547,7 +3552,7 @@
               <a:pPr algn="ctr"/>
               <a:r>
                 <a:rPr lang="en-US" sz="1200" dirty="0"/>
-                <a:t>Objective Variables</a:t>
+                <a:t>objective variables</a:t>
               </a:r>
               <a:endParaRPr lang="en-US" sz="1600" dirty="0"/>
             </a:p>
@@ -3652,7 +3657,7 @@
               <a:pPr algn="ctr"/>
               <a:r>
                 <a:rPr lang="en-US" sz="1400" dirty="0"/>
-                <a:t>Player Inputs</a:t>
+                <a:t>player inputs</a:t>
               </a:r>
               <a:endParaRPr lang="en-US" dirty="0"/>
             </a:p>
@@ -3757,7 +3762,7 @@
               <a:pPr algn="ctr"/>
               <a:r>
                 <a:rPr lang="en-US" sz="1200" dirty="0"/>
-                <a:t>Data Transformation</a:t>
+                <a:t>data transformation</a:t>
               </a:r>
               <a:endParaRPr lang="en-US" sz="1600" dirty="0"/>
             </a:p>
@@ -5208,7 +5213,7 @@
               <a:pPr algn="ctr"/>
               <a:r>
                 <a:rPr lang="en-US" sz="1400" dirty="0"/>
-                <a:t>Draft Inputs</a:t>
+                <a:t>draft inputs</a:t>
               </a:r>
               <a:endParaRPr lang="en-US" dirty="0"/>
             </a:p>

</xml_diff>